<commit_message>
Final version (including fixes made during actual presentation)
git-svn-id: file://localhost/tmp/svn2git/svn@1712 defb5e50-622e-49ec-a68e-d72c7db87b45
</commit_message>
<xml_diff>
--- a/tutorial/NeSC-2009/NeSC09-Practical-PPT.pptx
+++ b/tutorial/NeSC-2009/NeSC09-Practical-PPT.pptx
@@ -271,7 +271,7 @@
             <a:fld id="{FD89E5DE-5FFC-4DBE-9A7F-2C9F568D0D45}" type="datetimeFigureOut">
               <a:rPr lang="en-US" smtClean="0"/>
               <a:pPr/>
-              <a:t>9/3/2009</a:t>
+              <a:t>9/4/2009</a:t>
             </a:fld>
             <a:endParaRPr lang="en-US"/>
           </a:p>
@@ -4851,7 +4851,15 @@
           <a:p>
             <a:r>
               <a:rPr lang="en-US" dirty="0" smtClean="0"/>
-              <a:t>SAGA: Simple Examples, Programming Manual SAGA-Shell, Example Applications</a:t>
+              <a:t>SAGA: Simple Examples, Programming </a:t>
+            </a:r>
+            <a:r>
+              <a:rPr lang="en-US" dirty="0" smtClean="0"/>
+              <a:t>Manual, </a:t>
+            </a:r>
+            <a:r>
+              <a:rPr lang="en-US" dirty="0" smtClean="0"/>
+              <a:t>SAGA-Shell, Example Applications</a:t>
             </a:r>
             <a:br>
               <a:rPr lang="en-US" dirty="0" smtClean="0"/>
@@ -4903,6 +4911,13 @@
     <a:masterClrMapping/>
   </p:clrMapOvr>
   <p:transition/>
+  <p:timing>
+    <p:tnLst>
+      <p:par>
+        <p:cTn id="1" dur="indefinite" restart="never" nodeType="tmRoot"/>
+      </p:par>
+    </p:tnLst>
+  </p:timing>
 </p:sld>
 </file>
 
@@ -9330,6 +9345,13 @@
   <p:clrMapOvr>
     <a:masterClrMapping/>
   </p:clrMapOvr>
+  <p:timing>
+    <p:tnLst>
+      <p:par>
+        <p:cTn id="1" dur="indefinite" restart="never" nodeType="tmRoot"/>
+      </p:par>
+    </p:tnLst>
+  </p:timing>
 </p:sld>
 </file>
 
@@ -13331,6 +13353,13 @@
     <a:masterClrMapping/>
   </p:clrMapOvr>
   <p:transition/>
+  <p:timing>
+    <p:tnLst>
+      <p:par>
+        <p:cTn id="1" dur="indefinite" restart="never" nodeType="tmRoot"/>
+      </p:par>
+    </p:tnLst>
+  </p:timing>
 </p:sld>
 </file>
 
@@ -13891,7 +13920,7 @@
         <p:spPr>
           <a:xfrm>
             <a:off x="863600" y="3626584"/>
-            <a:ext cx="11353800" cy="1631216"/>
+            <a:ext cx="11353800" cy="1938992"/>
           </a:xfrm>
           <a:prstGeom prst="rect">
             <a:avLst/>
@@ -13922,8 +13951,19 @@
                 <a:latin typeface="Consolas" pitchFamily="49" charset="0"/>
                 <a:cs typeface="Consolas" pitchFamily="49" charset="0"/>
               </a:rPr>
-              <a:t>saga::stream::server s("tcp://tc17");</a:t>
-            </a:r>
+              <a:t>saga::stream::server s("tcp://</a:t>
+            </a:r>
+            <a:r>
+              <a:rPr lang="en-US" sz="2000" dirty="0" smtClean="0">
+                <a:latin typeface="Consolas" pitchFamily="49" charset="0"/>
+                <a:cs typeface="Consolas" pitchFamily="49" charset="0"/>
+              </a:rPr>
+              <a:t>tc17:&lt;port&gt;");</a:t>
+            </a:r>
+            <a:endParaRPr lang="en-US" sz="2000" dirty="0" smtClean="0">
+              <a:latin typeface="Consolas" pitchFamily="49" charset="0"/>
+              <a:cs typeface="Consolas" pitchFamily="49" charset="0"/>
+            </a:endParaRPr>
           </a:p>
           <a:p>
             <a:pPr marL="0" lvl="3" algn="l"/>
@@ -13942,8 +13982,50 @@
                 <a:latin typeface="Consolas" pitchFamily="49" charset="0"/>
                 <a:cs typeface="Consolas" pitchFamily="49" charset="0"/>
               </a:rPr>
-              <a:t>    ("advert://macpro01.cct.lsu.edu/NeSC2009/exercise_3/&lt;uid&gt;");</a:t>
-            </a:r>
+              <a:t>    ("advert://macpro01.cct.lsu.edu/NeSC2009/exercise_3/&lt;uid</a:t>
+            </a:r>
+            <a:r>
+              <a:rPr lang="en-US" sz="2000" dirty="0" smtClean="0">
+                <a:latin typeface="Consolas" pitchFamily="49" charset="0"/>
+                <a:cs typeface="Consolas" pitchFamily="49" charset="0"/>
+              </a:rPr>
+              <a:t>&gt;“,</a:t>
+            </a:r>
+          </a:p>
+          <a:p>
+            <a:pPr marL="0" lvl="3" algn="l"/>
+            <a:r>
+              <a:rPr lang="en-US" sz="2000" dirty="0" smtClean="0">
+                <a:latin typeface="Consolas" pitchFamily="49" charset="0"/>
+                <a:cs typeface="Consolas" pitchFamily="49" charset="0"/>
+              </a:rPr>
+              <a:t> </a:t>
+            </a:r>
+            <a:r>
+              <a:rPr lang="en-US" sz="2000" dirty="0" smtClean="0">
+                <a:latin typeface="Consolas" pitchFamily="49" charset="0"/>
+                <a:cs typeface="Consolas" pitchFamily="49" charset="0"/>
+              </a:rPr>
+              <a:t>    saga::advert::</a:t>
+            </a:r>
+            <a:r>
+              <a:rPr lang="en-US" sz="2000" dirty="0" err="1" smtClean="0">
+                <a:latin typeface="Consolas" pitchFamily="49" charset="0"/>
+                <a:cs typeface="Consolas" pitchFamily="49" charset="0"/>
+              </a:rPr>
+              <a:t>CreateParents</a:t>
+            </a:r>
+            <a:r>
+              <a:rPr lang="en-US" sz="2000" dirty="0" smtClean="0">
+                <a:latin typeface="Consolas" pitchFamily="49" charset="0"/>
+                <a:cs typeface="Consolas" pitchFamily="49" charset="0"/>
+              </a:rPr>
+              <a:t>);</a:t>
+            </a:r>
+            <a:endParaRPr lang="en-US" sz="2000" dirty="0" smtClean="0">
+              <a:latin typeface="Consolas" pitchFamily="49" charset="0"/>
+              <a:cs typeface="Consolas" pitchFamily="49" charset="0"/>
+            </a:endParaRPr>
           </a:p>
           <a:p>
             <a:pPr marL="0" lvl="3" algn="l"/>
@@ -14034,7 +14116,21 @@
                 <a:latin typeface="Consolas" pitchFamily="49" charset="0"/>
                 <a:cs typeface="Consolas" pitchFamily="49" charset="0"/>
               </a:rPr>
-              <a:t>saga::stream::stream c (</a:t>
+              <a:t>saga::stream</a:t>
+            </a:r>
+            <a:r>
+              <a:rPr lang="en-US" sz="2000" dirty="0" smtClean="0">
+                <a:latin typeface="Consolas" pitchFamily="49" charset="0"/>
+                <a:cs typeface="Consolas" pitchFamily="49" charset="0"/>
+              </a:rPr>
+              <a:t>::server s </a:t>
+            </a:r>
+            <a:r>
+              <a:rPr lang="en-US" sz="2000" dirty="0" smtClean="0">
+                <a:latin typeface="Consolas" pitchFamily="49" charset="0"/>
+                <a:cs typeface="Consolas" pitchFamily="49" charset="0"/>
+              </a:rPr>
+              <a:t>(</a:t>
             </a:r>
             <a:r>
               <a:rPr lang="en-US" sz="2000" dirty="0" err="1" smtClean="0">
@@ -14054,19 +14150,44 @@
           <a:p>
             <a:pPr marL="0" lvl="3" algn="l"/>
             <a:r>
+              <a:rPr lang="en-US" sz="2000" dirty="0" smtClean="0">
+                <a:latin typeface="Consolas" pitchFamily="49" charset="0"/>
+                <a:cs typeface="Consolas" pitchFamily="49" charset="0"/>
+              </a:rPr>
+              <a:t>saga::stream</a:t>
+            </a:r>
+            <a:r>
+              <a:rPr lang="en-US" sz="2000" smtClean="0">
+                <a:latin typeface="Consolas" pitchFamily="49" charset="0"/>
+                <a:cs typeface="Consolas" pitchFamily="49" charset="0"/>
+              </a:rPr>
+              <a:t>::stream c </a:t>
+            </a:r>
+            <a:r>
+              <a:rPr lang="en-US" sz="2000" dirty="0" smtClean="0">
+                <a:latin typeface="Consolas" pitchFamily="49" charset="0"/>
+                <a:cs typeface="Consolas" pitchFamily="49" charset="0"/>
+              </a:rPr>
+              <a:t>(</a:t>
+            </a:r>
+            <a:r>
               <a:rPr lang="en-US" sz="2000" dirty="0" err="1" smtClean="0">
                 <a:latin typeface="Consolas" pitchFamily="49" charset="0"/>
                 <a:cs typeface="Consolas" pitchFamily="49" charset="0"/>
               </a:rPr>
-              <a:t>c.connect</a:t>
+              <a:t>s.get_url</a:t>
             </a:r>
             <a:r>
               <a:rPr lang="en-US" sz="2000" dirty="0" smtClean="0">
                 <a:latin typeface="Consolas" pitchFamily="49" charset="0"/>
                 <a:cs typeface="Consolas" pitchFamily="49" charset="0"/>
               </a:rPr>
-              <a:t>();</a:t>
-            </a:r>
+              <a:t>());</a:t>
+            </a:r>
+            <a:endParaRPr lang="en-US" sz="2000" dirty="0" smtClean="0">
+              <a:latin typeface="Consolas" pitchFamily="49" charset="0"/>
+              <a:cs typeface="Consolas" pitchFamily="49" charset="0"/>
+            </a:endParaRPr>
           </a:p>
           <a:p>
             <a:pPr marL="0" lvl="3" algn="l"/>
@@ -15792,11 +15913,7 @@
           <a:p>
             <a:r>
               <a:rPr lang="en-US" dirty="0" smtClean="0"/>
-              <a:t>Credentials: </a:t>
-            </a:r>
-            <a:r>
-              <a:rPr lang="en-US" dirty="0" smtClean="0"/>
-              <a:t> </a:t>
+              <a:t>Credentials:  </a:t>
             </a:r>
           </a:p>
           <a:p>
@@ -15807,7 +15924,6 @@
               <a:rPr lang="en-US" sz="3600" dirty="0" smtClean="0"/>
               <a:t>		   course01, course02,…, course12</a:t>
             </a:r>
-            <a:endParaRPr lang="en-US" sz="3600" dirty="0" smtClean="0"/>
           </a:p>
           <a:p>
             <a:endParaRPr lang="en-US" dirty="0"/>
@@ -15890,6 +16006,13 @@
     <a:masterClrMapping/>
   </p:clrMapOvr>
   <p:transition/>
+  <p:timing>
+    <p:tnLst>
+      <p:par>
+        <p:cTn id="1" dur="indefinite" restart="never" nodeType="tmRoot"/>
+      </p:par>
+    </p:tnLst>
+  </p:timing>
 </p:sld>
 </file>
 
@@ -17065,11 +17188,15 @@
             </a:r>
             <a:r>
               <a:rPr lang="en-US" dirty="0" smtClean="0"/>
-              <a:t>	$SAGA_ROOT/saga/tools/</a:t>
+              <a:t>	$</a:t>
+            </a:r>
+            <a:r>
+              <a:rPr lang="en-US" dirty="0" smtClean="0"/>
+              <a:t>SAGA_ROOT/saga/tools/</a:t>
             </a:r>
             <a:r>
               <a:rPr lang="en-US" dirty="0" err="1" smtClean="0"/>
-              <a:t>cltools</a:t>
+              <a:t>clutils</a:t>
             </a:r>
             <a:r>
               <a:rPr lang="en-US" dirty="0" smtClean="0"/>
@@ -17088,11 +17215,15 @@
             </a:pPr>
             <a:r>
               <a:rPr lang="en-US" dirty="0" smtClean="0"/>
-              <a:t>saga-job 	$SAGA_ROOT/saga/tools/</a:t>
+              <a:t>saga-job 	$</a:t>
+            </a:r>
+            <a:r>
+              <a:rPr lang="en-US" dirty="0" smtClean="0"/>
+              <a:t>SAGA_ROOT/saga/tools/</a:t>
             </a:r>
             <a:r>
               <a:rPr lang="en-US" dirty="0" err="1" smtClean="0"/>
-              <a:t>cltools</a:t>
+              <a:t>clutils</a:t>
             </a:r>
             <a:r>
               <a:rPr lang="en-US" dirty="0" smtClean="0"/>
@@ -17115,11 +17246,15 @@
             </a:r>
             <a:r>
               <a:rPr lang="en-US" dirty="0" smtClean="0"/>
-              <a:t>	$SAGA_ROOT/saga/tools/</a:t>
+              <a:t>	$</a:t>
+            </a:r>
+            <a:r>
+              <a:rPr lang="en-US" dirty="0" smtClean="0"/>
+              <a:t>SAGA_ROOT/saga/tools/</a:t>
             </a:r>
             <a:r>
               <a:rPr lang="en-US" dirty="0" err="1" smtClean="0"/>
-              <a:t>cltools</a:t>
+              <a:t>clutils</a:t>
             </a:r>
             <a:r>
               <a:rPr lang="en-US" dirty="0" smtClean="0"/>
@@ -17142,15 +17277,23 @@
             </a:r>
             <a:r>
               <a:rPr lang="en-US" dirty="0" smtClean="0"/>
-              <a:t>	$SAGA_ROOT/saga/tools/</a:t>
+              <a:t>	$</a:t>
+            </a:r>
+            <a:r>
+              <a:rPr lang="en-US" dirty="0" smtClean="0"/>
+              <a:t>SAGA_ROOT/saga/tools/</a:t>
             </a:r>
             <a:r>
               <a:rPr lang="en-US" dirty="0" err="1" smtClean="0"/>
-              <a:t>cltools</a:t>
+              <a:t>clutils</a:t>
             </a:r>
             <a:r>
               <a:rPr lang="en-US" dirty="0" smtClean="0"/>
-              <a:t>/replica/</a:t>
+              <a:t>/replica</a:t>
+            </a:r>
+            <a:r>
+              <a:rPr lang="en-US" dirty="0" smtClean="0"/>
+              <a:t>/</a:t>
             </a:r>
           </a:p>
           <a:p>

</xml_diff>